<commit_message>
Update Projet Info – Jeu 2048.pptx
</commit_message>
<xml_diff>
--- a/Projet Info – Jeu 2048.pptx
+++ b/Projet Info – Jeu 2048.pptx
@@ -10629,8 +10629,8 @@
         </p:nvSpPr>
         <p:spPr>
           <a:xfrm>
-            <a:off x="6477000" y="1877686"/>
-            <a:ext cx="5438775" cy="3693319"/>
+            <a:off x="6477000" y="1452568"/>
+            <a:ext cx="5438775" cy="4247317"/>
           </a:xfrm>
           <a:prstGeom prst="rect">
             <a:avLst/>
@@ -10678,6 +10678,16 @@
             <a:r>
               <a:rPr lang="fr-FR" dirty="0"/>
               <a:t> de la grille dans la direction donnée.</a:t>
+            </a:r>
+          </a:p>
+          <a:p>
+            <a:pPr marL="285750" indent="-285750">
+              <a:buFont typeface="Arial" panose="020B0604020202020204" pitchFamily="34" charset="0"/>
+              <a:buChar char="•"/>
+            </a:pPr>
+            <a:r>
+              <a:rPr lang="fr-FR" dirty="0"/>
+              <a:t>Si deux tuiles adjacentes sont identiques dans la même direction, elles s’additionnent. </a:t>
             </a:r>
           </a:p>
           <a:p>
@@ -11533,7 +11543,7 @@
           <a:p>
             <a:r>
               <a:rPr lang="fr-FR" dirty="0"/>
-              <a:t>fait tourner de 90° dan sans trigo la matrice</a:t>
+              <a:t>fait tourner de 90° dans sens trigo la matrice</a:t>
             </a:r>
           </a:p>
           <a:p>

</xml_diff>